<commit_message>
09-JavaScript-Basics - homework change
</commit_message>
<xml_diff>
--- a/09-JavaScript-Basics/09-JavaScript-Basics.pptx
+++ b/09-JavaScript-Basics/09-JavaScript-Basics.pptx
@@ -297,7 +297,7 @@
           <a:p>
             <a:fld id="{2E054F57-E93D-4CC3-8A27-2F256E70BB98}" type="datetimeFigureOut">
               <a:rPr lang="en-US" smtClean="0"/>
-              <a:t>6/27/2016</a:t>
+              <a:t>7/4/2016</a:t>
             </a:fld>
             <a:endParaRPr lang="en-US"/>
           </a:p>
@@ -746,7 +746,7 @@
           <a:p>
             <a:fld id="{3EA744D9-3FBE-48D8-BF2A-85DF203E4D20}" type="datetimeFigureOut">
               <a:rPr lang="bg-BG" smtClean="0"/>
-              <a:t>27.6.2016 г.</a:t>
+              <a:t>4.7.2016 г.</a:t>
             </a:fld>
             <a:endParaRPr lang="bg-BG"/>
           </a:p>
@@ -916,7 +916,7 @@
           <a:p>
             <a:fld id="{3EA744D9-3FBE-48D8-BF2A-85DF203E4D20}" type="datetimeFigureOut">
               <a:rPr lang="bg-BG" smtClean="0"/>
-              <a:t>27.6.2016 г.</a:t>
+              <a:t>4.7.2016 г.</a:t>
             </a:fld>
             <a:endParaRPr lang="bg-BG"/>
           </a:p>
@@ -1096,7 +1096,7 @@
           <a:p>
             <a:fld id="{3EA744D9-3FBE-48D8-BF2A-85DF203E4D20}" type="datetimeFigureOut">
               <a:rPr lang="bg-BG" smtClean="0"/>
-              <a:t>27.6.2016 г.</a:t>
+              <a:t>4.7.2016 г.</a:t>
             </a:fld>
             <a:endParaRPr lang="bg-BG"/>
           </a:p>
@@ -1266,7 +1266,7 @@
           <a:p>
             <a:fld id="{3EA744D9-3FBE-48D8-BF2A-85DF203E4D20}" type="datetimeFigureOut">
               <a:rPr lang="bg-BG" smtClean="0"/>
-              <a:t>27.6.2016 г.</a:t>
+              <a:t>4.7.2016 г.</a:t>
             </a:fld>
             <a:endParaRPr lang="bg-BG"/>
           </a:p>
@@ -1512,7 +1512,7 @@
           <a:p>
             <a:fld id="{3EA744D9-3FBE-48D8-BF2A-85DF203E4D20}" type="datetimeFigureOut">
               <a:rPr lang="bg-BG" smtClean="0"/>
-              <a:t>27.6.2016 г.</a:t>
+              <a:t>4.7.2016 г.</a:t>
             </a:fld>
             <a:endParaRPr lang="bg-BG"/>
           </a:p>
@@ -1800,7 +1800,7 @@
           <a:p>
             <a:fld id="{3EA744D9-3FBE-48D8-BF2A-85DF203E4D20}" type="datetimeFigureOut">
               <a:rPr lang="bg-BG" smtClean="0"/>
-              <a:t>27.6.2016 г.</a:t>
+              <a:t>4.7.2016 г.</a:t>
             </a:fld>
             <a:endParaRPr lang="bg-BG"/>
           </a:p>
@@ -2222,7 +2222,7 @@
           <a:p>
             <a:fld id="{3EA744D9-3FBE-48D8-BF2A-85DF203E4D20}" type="datetimeFigureOut">
               <a:rPr lang="bg-BG" smtClean="0"/>
-              <a:t>27.6.2016 г.</a:t>
+              <a:t>4.7.2016 г.</a:t>
             </a:fld>
             <a:endParaRPr lang="bg-BG"/>
           </a:p>
@@ -2340,7 +2340,7 @@
           <a:p>
             <a:fld id="{3EA744D9-3FBE-48D8-BF2A-85DF203E4D20}" type="datetimeFigureOut">
               <a:rPr lang="bg-BG" smtClean="0"/>
-              <a:t>27.6.2016 г.</a:t>
+              <a:t>4.7.2016 г.</a:t>
             </a:fld>
             <a:endParaRPr lang="bg-BG"/>
           </a:p>
@@ -2435,7 +2435,7 @@
           <a:p>
             <a:fld id="{3EA744D9-3FBE-48D8-BF2A-85DF203E4D20}" type="datetimeFigureOut">
               <a:rPr lang="bg-BG" smtClean="0"/>
-              <a:t>27.6.2016 г.</a:t>
+              <a:t>4.7.2016 г.</a:t>
             </a:fld>
             <a:endParaRPr lang="bg-BG"/>
           </a:p>
@@ -2712,7 +2712,7 @@
           <a:p>
             <a:fld id="{3EA744D9-3FBE-48D8-BF2A-85DF203E4D20}" type="datetimeFigureOut">
               <a:rPr lang="bg-BG" smtClean="0"/>
-              <a:t>27.6.2016 г.</a:t>
+              <a:t>4.7.2016 г.</a:t>
             </a:fld>
             <a:endParaRPr lang="bg-BG"/>
           </a:p>
@@ -2965,7 +2965,7 @@
           <a:p>
             <a:fld id="{3EA744D9-3FBE-48D8-BF2A-85DF203E4D20}" type="datetimeFigureOut">
               <a:rPr lang="bg-BG" smtClean="0"/>
-              <a:t>27.6.2016 г.</a:t>
+              <a:t>4.7.2016 г.</a:t>
             </a:fld>
             <a:endParaRPr lang="bg-BG"/>
           </a:p>
@@ -3187,7 +3187,7 @@
           <a:p>
             <a:fld id="{3EA744D9-3FBE-48D8-BF2A-85DF203E4D20}" type="datetimeFigureOut">
               <a:rPr lang="bg-BG" smtClean="0"/>
-              <a:t>27.6.2016 г.</a:t>
+              <a:t>4.7.2016 г.</a:t>
             </a:fld>
             <a:endParaRPr lang="bg-BG"/>
           </a:p>
@@ -8206,16 +8206,7 @@
                 </a:solidFill>
                 <a:cs typeface="Courier New" panose="02070309020205020404" pitchFamily="49" charset="0"/>
               </a:rPr>
-              <a:t>с</a:t>
-            </a:r>
-            <a:r>
-              <a:rPr lang="bg-BG" sz="3200" dirty="0" smtClean="0">
-                <a:solidFill>
-                  <a:schemeClr val="bg1"/>
-                </a:solidFill>
-                <a:cs typeface="Courier New" panose="02070309020205020404" pitchFamily="49" charset="0"/>
-              </a:rPr>
-              <a:t>равнителни </a:t>
+              <a:t>сравнителни </a:t>
             </a:r>
             <a:r>
               <a:rPr lang="bg-BG" sz="3200" dirty="0">
@@ -11872,25 +11863,7 @@
                 </a:solidFill>
                 <a:cs typeface="Courier New" panose="02070309020205020404" pitchFamily="49" charset="0"/>
               </a:rPr>
-              <a:t>Това е най-простият условен </a:t>
-            </a:r>
-            <a:r>
-              <a:rPr lang="bg-BG" sz="2500" dirty="0" smtClean="0">
-                <a:solidFill>
-                  <a:schemeClr val="bg1"/>
-                </a:solidFill>
-                <a:cs typeface="Courier New" panose="02070309020205020404" pitchFamily="49" charset="0"/>
-              </a:rPr>
-              <a:t>израз. </a:t>
-            </a:r>
-            <a:r>
-              <a:rPr lang="bg-BG" sz="2500" dirty="0" smtClean="0">
-                <a:solidFill>
-                  <a:schemeClr val="bg1"/>
-                </a:solidFill>
-                <a:cs typeface="Courier New" panose="02070309020205020404" pitchFamily="49" charset="0"/>
-              </a:rPr>
-              <a:t>Позвоява да се тества дали дадено условие е изпълнено. Чрез него можем да изпълняваме даден код, в зависимост от това дали дадено условие е истина. Пример:</a:t>
+              <a:t>Това е най-простият условен израз. Позвоява да се тества дали дадено условие е изпълнено. Чрез него можем да изпълняваме даден код, в зависимост от това дали дадено условие е истина. Пример:</a:t>
             </a:r>
           </a:p>
           <a:p>
@@ -14260,14 +14233,24 @@
               <a:buNone/>
             </a:pPr>
             <a:r>
-              <a:rPr lang="en-US" sz="1800" dirty="0">
+              <a:rPr lang="en-US" sz="1800" dirty="0" smtClean="0">
                 <a:solidFill>
                   <a:srgbClr val="92D050"/>
                 </a:solidFill>
                 <a:latin typeface="Courier New" panose="02070309020205020404" pitchFamily="49" charset="0"/>
                 <a:cs typeface="Courier New" panose="02070309020205020404" pitchFamily="49" charset="0"/>
               </a:rPr>
-              <a:t>	</a:t>
+              <a:t>	case 3: console.log(</a:t>
+            </a:r>
+            <a:r>
+              <a:rPr lang="bg-BG" sz="1800" dirty="0" smtClean="0">
+                <a:solidFill>
+                  <a:srgbClr val="92D050"/>
+                </a:solidFill>
+                <a:latin typeface="Courier New" panose="02070309020205020404" pitchFamily="49" charset="0"/>
+                <a:cs typeface="Courier New" panose="02070309020205020404" pitchFamily="49" charset="0"/>
+              </a:rPr>
+              <a:t>„Среден 3“); </a:t>
             </a:r>
             <a:r>
               <a:rPr lang="en-US" sz="1800" dirty="0" smtClean="0">
@@ -14277,7 +14260,22 @@
                 <a:latin typeface="Courier New" panose="02070309020205020404" pitchFamily="49" charset="0"/>
                 <a:cs typeface="Courier New" panose="02070309020205020404" pitchFamily="49" charset="0"/>
               </a:rPr>
-              <a:t>case 3: console.log(</a:t>
+              <a:t>break;</a:t>
+            </a:r>
+          </a:p>
+          <a:p>
+            <a:pPr marL="0" indent="0">
+              <a:buNone/>
+            </a:pPr>
+            <a:r>
+              <a:rPr lang="en-US" sz="1800" dirty="0" smtClean="0">
+                <a:solidFill>
+                  <a:srgbClr val="92D050"/>
+                </a:solidFill>
+                <a:latin typeface="Courier New" panose="02070309020205020404" pitchFamily="49" charset="0"/>
+                <a:cs typeface="Courier New" panose="02070309020205020404" pitchFamily="49" charset="0"/>
+              </a:rPr>
+              <a:t>	case 4: console.log(</a:t>
             </a:r>
             <a:r>
               <a:rPr lang="bg-BG" sz="1800" dirty="0" smtClean="0">
@@ -14287,7 +14285,7 @@
                 <a:latin typeface="Courier New" panose="02070309020205020404" pitchFamily="49" charset="0"/>
                 <a:cs typeface="Courier New" panose="02070309020205020404" pitchFamily="49" charset="0"/>
               </a:rPr>
-              <a:t>„Среден 3“); </a:t>
+              <a:t>„Добър 4“); </a:t>
             </a:r>
             <a:r>
               <a:rPr lang="en-US" sz="1800" dirty="0" smtClean="0">
@@ -14305,14 +14303,24 @@
               <a:buNone/>
             </a:pPr>
             <a:r>
-              <a:rPr lang="en-US" sz="1800" dirty="0">
+              <a:rPr lang="en-US" sz="1800" dirty="0" smtClean="0">
                 <a:solidFill>
                   <a:srgbClr val="92D050"/>
                 </a:solidFill>
                 <a:latin typeface="Courier New" panose="02070309020205020404" pitchFamily="49" charset="0"/>
                 <a:cs typeface="Courier New" panose="02070309020205020404" pitchFamily="49" charset="0"/>
               </a:rPr>
-              <a:t>	</a:t>
+              <a:t>	case 5: console.log(</a:t>
+            </a:r>
+            <a:r>
+              <a:rPr lang="bg-BG" sz="1800" dirty="0" smtClean="0">
+                <a:solidFill>
+                  <a:srgbClr val="92D050"/>
+                </a:solidFill>
+                <a:latin typeface="Courier New" panose="02070309020205020404" pitchFamily="49" charset="0"/>
+                <a:cs typeface="Courier New" panose="02070309020205020404" pitchFamily="49" charset="0"/>
+              </a:rPr>
+              <a:t>„Много добър 5“); </a:t>
             </a:r>
             <a:r>
               <a:rPr lang="en-US" sz="1800" dirty="0" smtClean="0">
@@ -14322,7 +14330,22 @@
                 <a:latin typeface="Courier New" panose="02070309020205020404" pitchFamily="49" charset="0"/>
                 <a:cs typeface="Courier New" panose="02070309020205020404" pitchFamily="49" charset="0"/>
               </a:rPr>
-              <a:t>case 4: console.log(</a:t>
+              <a:t>break;</a:t>
+            </a:r>
+          </a:p>
+          <a:p>
+            <a:pPr marL="0" indent="0">
+              <a:buNone/>
+            </a:pPr>
+            <a:r>
+              <a:rPr lang="en-US" sz="1800" dirty="0" smtClean="0">
+                <a:solidFill>
+                  <a:srgbClr val="92D050"/>
+                </a:solidFill>
+                <a:latin typeface="Courier New" panose="02070309020205020404" pitchFamily="49" charset="0"/>
+                <a:cs typeface="Courier New" panose="02070309020205020404" pitchFamily="49" charset="0"/>
+              </a:rPr>
+              <a:t>	case 6: console.log(</a:t>
             </a:r>
             <a:r>
               <a:rPr lang="bg-BG" sz="1800" dirty="0" smtClean="0">
@@ -14332,7 +14355,7 @@
                 <a:latin typeface="Courier New" panose="02070309020205020404" pitchFamily="49" charset="0"/>
                 <a:cs typeface="Courier New" panose="02070309020205020404" pitchFamily="49" charset="0"/>
               </a:rPr>
-              <a:t>„Добър 4“); </a:t>
+              <a:t>„Отличен 6“)</a:t>
             </a:r>
             <a:r>
               <a:rPr lang="en-US" sz="1800" dirty="0" smtClean="0">
@@ -14342,22 +14365,32 @@
                 <a:latin typeface="Courier New" panose="02070309020205020404" pitchFamily="49" charset="0"/>
                 <a:cs typeface="Courier New" panose="02070309020205020404" pitchFamily="49" charset="0"/>
               </a:rPr>
-              <a:t>break;</a:t>
-            </a:r>
-          </a:p>
-          <a:p>
-            <a:pPr marL="0" indent="0">
-              <a:buNone/>
-            </a:pPr>
-            <a:r>
-              <a:rPr lang="en-US" sz="1800" dirty="0">
+              <a:t>; break;</a:t>
+            </a:r>
+          </a:p>
+          <a:p>
+            <a:pPr marL="0" indent="0">
+              <a:buNone/>
+            </a:pPr>
+            <a:r>
+              <a:rPr lang="en-US" sz="1800" dirty="0" smtClean="0">
                 <a:solidFill>
                   <a:srgbClr val="92D050"/>
                 </a:solidFill>
                 <a:latin typeface="Courier New" panose="02070309020205020404" pitchFamily="49" charset="0"/>
                 <a:cs typeface="Courier New" panose="02070309020205020404" pitchFamily="49" charset="0"/>
               </a:rPr>
-              <a:t>	</a:t>
+              <a:t>	default: console.log(</a:t>
+            </a:r>
+            <a:r>
+              <a:rPr lang="bg-BG" sz="1800" dirty="0" smtClean="0">
+                <a:solidFill>
+                  <a:srgbClr val="92D050"/>
+                </a:solidFill>
+                <a:latin typeface="Courier New" panose="02070309020205020404" pitchFamily="49" charset="0"/>
+                <a:cs typeface="Courier New" panose="02070309020205020404" pitchFamily="49" charset="0"/>
+              </a:rPr>
+              <a:t>„Грешка“);</a:t>
             </a:r>
             <a:r>
               <a:rPr lang="en-US" sz="1800" dirty="0" smtClean="0">
@@ -14367,134 +14400,24 @@
                 <a:latin typeface="Courier New" panose="02070309020205020404" pitchFamily="49" charset="0"/>
                 <a:cs typeface="Courier New" panose="02070309020205020404" pitchFamily="49" charset="0"/>
               </a:rPr>
-              <a:t>case 5: console.log(</a:t>
-            </a:r>
-            <a:r>
-              <a:rPr lang="bg-BG" sz="1800" dirty="0" smtClean="0">
+              <a:t> break;</a:t>
+            </a:r>
+          </a:p>
+          <a:p>
+            <a:pPr marL="0" indent="0">
+              <a:buNone/>
+            </a:pPr>
+            <a:r>
+              <a:rPr lang="en-US" sz="1800" dirty="0" smtClean="0">
                 <a:solidFill>
                   <a:srgbClr val="92D050"/>
                 </a:solidFill>
                 <a:latin typeface="Courier New" panose="02070309020205020404" pitchFamily="49" charset="0"/>
                 <a:cs typeface="Courier New" panose="02070309020205020404" pitchFamily="49" charset="0"/>
               </a:rPr>
-              <a:t>„Много добър 5“); </a:t>
-            </a:r>
-            <a:r>
-              <a:rPr lang="en-US" sz="1800" dirty="0" smtClean="0">
-                <a:solidFill>
-                  <a:srgbClr val="92D050"/>
-                </a:solidFill>
-                <a:latin typeface="Courier New" panose="02070309020205020404" pitchFamily="49" charset="0"/>
-                <a:cs typeface="Courier New" panose="02070309020205020404" pitchFamily="49" charset="0"/>
-              </a:rPr>
-              <a:t>break;</a:t>
-            </a:r>
-          </a:p>
-          <a:p>
-            <a:pPr marL="0" indent="0">
-              <a:buNone/>
-            </a:pPr>
-            <a:r>
-              <a:rPr lang="en-US" sz="1800" dirty="0">
-                <a:solidFill>
-                  <a:srgbClr val="92D050"/>
-                </a:solidFill>
-                <a:latin typeface="Courier New" panose="02070309020205020404" pitchFamily="49" charset="0"/>
-                <a:cs typeface="Courier New" panose="02070309020205020404" pitchFamily="49" charset="0"/>
-              </a:rPr>
-              <a:t>	</a:t>
-            </a:r>
-            <a:r>
-              <a:rPr lang="en-US" sz="1800" dirty="0" smtClean="0">
-                <a:solidFill>
-                  <a:srgbClr val="92D050"/>
-                </a:solidFill>
-                <a:latin typeface="Courier New" panose="02070309020205020404" pitchFamily="49" charset="0"/>
-                <a:cs typeface="Courier New" panose="02070309020205020404" pitchFamily="49" charset="0"/>
-              </a:rPr>
-              <a:t>case 6: console.log(</a:t>
-            </a:r>
-            <a:r>
-              <a:rPr lang="bg-BG" sz="1800" dirty="0" smtClean="0">
-                <a:solidFill>
-                  <a:srgbClr val="92D050"/>
-                </a:solidFill>
-                <a:latin typeface="Courier New" panose="02070309020205020404" pitchFamily="49" charset="0"/>
-                <a:cs typeface="Courier New" panose="02070309020205020404" pitchFamily="49" charset="0"/>
-              </a:rPr>
-              <a:t>„Отличен 6“)</a:t>
-            </a:r>
-            <a:r>
-              <a:rPr lang="en-US" sz="1800" dirty="0" smtClean="0">
-                <a:solidFill>
-                  <a:srgbClr val="92D050"/>
-                </a:solidFill>
-                <a:latin typeface="Courier New" panose="02070309020205020404" pitchFamily="49" charset="0"/>
-                <a:cs typeface="Courier New" panose="02070309020205020404" pitchFamily="49" charset="0"/>
-              </a:rPr>
-              <a:t>; break;</a:t>
-            </a:r>
-          </a:p>
-          <a:p>
-            <a:pPr marL="0" indent="0">
-              <a:buNone/>
-            </a:pPr>
-            <a:r>
-              <a:rPr lang="en-US" sz="1800" dirty="0">
-                <a:solidFill>
-                  <a:srgbClr val="92D050"/>
-                </a:solidFill>
-                <a:latin typeface="Courier New" panose="02070309020205020404" pitchFamily="49" charset="0"/>
-                <a:cs typeface="Courier New" panose="02070309020205020404" pitchFamily="49" charset="0"/>
-              </a:rPr>
-              <a:t>	</a:t>
-            </a:r>
-            <a:r>
-              <a:rPr lang="en-US" sz="1800" dirty="0" smtClean="0">
-                <a:solidFill>
-                  <a:srgbClr val="92D050"/>
-                </a:solidFill>
-                <a:latin typeface="Courier New" panose="02070309020205020404" pitchFamily="49" charset="0"/>
-                <a:cs typeface="Courier New" panose="02070309020205020404" pitchFamily="49" charset="0"/>
-              </a:rPr>
-              <a:t>default: console.log(</a:t>
-            </a:r>
-            <a:r>
-              <a:rPr lang="bg-BG" sz="1800" dirty="0" smtClean="0">
-                <a:solidFill>
-                  <a:srgbClr val="92D050"/>
-                </a:solidFill>
-                <a:latin typeface="Courier New" panose="02070309020205020404" pitchFamily="49" charset="0"/>
-                <a:cs typeface="Courier New" panose="02070309020205020404" pitchFamily="49" charset="0"/>
-              </a:rPr>
-              <a:t>„Грешка“);</a:t>
-            </a:r>
-            <a:r>
-              <a:rPr lang="en-US" sz="1800" dirty="0" smtClean="0">
-                <a:solidFill>
-                  <a:srgbClr val="92D050"/>
-                </a:solidFill>
-                <a:latin typeface="Courier New" panose="02070309020205020404" pitchFamily="49" charset="0"/>
-                <a:cs typeface="Courier New" panose="02070309020205020404" pitchFamily="49" charset="0"/>
-              </a:rPr>
-              <a:t> break;</a:t>
-            </a:r>
-          </a:p>
-          <a:p>
-            <a:pPr marL="0" indent="0">
-              <a:buNone/>
-            </a:pPr>
-            <a:r>
-              <a:rPr lang="en-US" sz="1800" dirty="0" smtClean="0">
-                <a:solidFill>
-                  <a:srgbClr val="92D050"/>
-                </a:solidFill>
-                <a:latin typeface="Courier New" panose="02070309020205020404" pitchFamily="49" charset="0"/>
-                <a:cs typeface="Courier New" panose="02070309020205020404" pitchFamily="49" charset="0"/>
-              </a:rPr>
               <a:t>}</a:t>
             </a:r>
-            <a:endParaRPr lang="en-US" sz="1800" dirty="0">
+            <a:endParaRPr lang="en-US" sz="1800" dirty="0" smtClean="0">
               <a:solidFill>
                 <a:srgbClr val="92D050"/>
               </a:solidFill>
@@ -18085,8 +18008,48 @@
                 <a:latin typeface="+mj-lt"/>
                 <a:cs typeface="Courier New" panose="02070309020205020404" pitchFamily="49" charset="0"/>
               </a:rPr>
-              <a:t>Декларираме </a:t>
-            </a:r>
+              <a:t>Декларираме масив от смесен тип:</a:t>
+            </a:r>
+          </a:p>
+          <a:p>
+            <a:pPr marL="0" indent="0">
+              <a:buNone/>
+            </a:pPr>
+            <a:r>
+              <a:rPr lang="en-US" sz="2000" dirty="0" smtClean="0">
+                <a:solidFill>
+                  <a:schemeClr val="bg1"/>
+                </a:solidFill>
+                <a:latin typeface="+mj-lt"/>
+                <a:cs typeface="Courier New" panose="02070309020205020404" pitchFamily="49" charset="0"/>
+              </a:rPr>
+              <a:t>var </a:t>
+            </a:r>
+            <a:r>
+              <a:rPr lang="en-US" sz="2000" dirty="0" err="1" smtClean="0">
+                <a:solidFill>
+                  <a:schemeClr val="bg1"/>
+                </a:solidFill>
+                <a:latin typeface="+mj-lt"/>
+                <a:cs typeface="Courier New" panose="02070309020205020404" pitchFamily="49" charset="0"/>
+              </a:rPr>
+              <a:t>myMixedArray</a:t>
+            </a:r>
+            <a:r>
+              <a:rPr lang="en-US" sz="2000" dirty="0" smtClean="0">
+                <a:solidFill>
+                  <a:schemeClr val="bg1"/>
+                </a:solidFill>
+                <a:latin typeface="+mj-lt"/>
+                <a:cs typeface="Courier New" panose="02070309020205020404" pitchFamily="49" charset="0"/>
+              </a:rPr>
+              <a:t> = [1, “John”, true];</a:t>
+            </a:r>
+          </a:p>
+          <a:p>
+            <a:pPr marL="0" indent="0">
+              <a:buNone/>
+            </a:pPr>
             <a:r>
               <a:rPr lang="bg-BG" sz="2000" dirty="0" smtClean="0">
                 <a:solidFill>
@@ -18095,37 +18058,7 @@
                 <a:latin typeface="+mj-lt"/>
                 <a:cs typeface="Courier New" panose="02070309020205020404" pitchFamily="49" charset="0"/>
               </a:rPr>
-              <a:t>маси</a:t>
-            </a:r>
-            <a:r>
-              <a:rPr lang="bg-BG" sz="2000" dirty="0" smtClean="0">
-                <a:solidFill>
-                  <a:schemeClr val="bg1"/>
-                </a:solidFill>
-                <a:latin typeface="+mj-lt"/>
-                <a:cs typeface="Courier New" panose="02070309020205020404" pitchFamily="49" charset="0"/>
-              </a:rPr>
-              <a:t>в </a:t>
-            </a:r>
-            <a:r>
-              <a:rPr lang="bg-BG" sz="2000" dirty="0" smtClean="0">
-                <a:solidFill>
-                  <a:schemeClr val="bg1"/>
-                </a:solidFill>
-                <a:latin typeface="+mj-lt"/>
-                <a:cs typeface="Courier New" panose="02070309020205020404" pitchFamily="49" charset="0"/>
-              </a:rPr>
-              <a:t>от </a:t>
-            </a:r>
-            <a:r>
-              <a:rPr lang="bg-BG" sz="2000" dirty="0" smtClean="0">
-                <a:solidFill>
-                  <a:schemeClr val="bg1"/>
-                </a:solidFill>
-                <a:latin typeface="+mj-lt"/>
-                <a:cs typeface="Courier New" panose="02070309020205020404" pitchFamily="49" charset="0"/>
-              </a:rPr>
-              <a:t>смесен тип:</a:t>
+              <a:t>Декларираме масив от масиви:</a:t>
             </a:r>
           </a:p>
           <a:p>
@@ -18150,7 +18083,7 @@
                 <a:latin typeface="+mj-lt"/>
                 <a:cs typeface="Courier New" panose="02070309020205020404" pitchFamily="49" charset="0"/>
               </a:rPr>
-              <a:t>myMixedArray</a:t>
+              <a:t>myMatrix</a:t>
             </a:r>
             <a:r>
               <a:rPr lang="en-US" sz="2000" dirty="0" smtClean="0">
@@ -18160,28 +18093,23 @@
                 <a:latin typeface="+mj-lt"/>
                 <a:cs typeface="Courier New" panose="02070309020205020404" pitchFamily="49" charset="0"/>
               </a:rPr>
-              <a:t> = [1, “John”, true];</a:t>
-            </a:r>
-          </a:p>
-          <a:p>
-            <a:pPr marL="0" indent="0">
-              <a:buNone/>
-            </a:pPr>
-            <a:r>
-              <a:rPr lang="bg-BG" sz="2000" dirty="0" smtClean="0">
-                <a:solidFill>
-                  <a:schemeClr val="bg1"/>
-                </a:solidFill>
-                <a:latin typeface="+mj-lt"/>
-                <a:cs typeface="Courier New" panose="02070309020205020404" pitchFamily="49" charset="0"/>
-              </a:rPr>
-              <a:t>Декларираме масив от масиви:</a:t>
-            </a:r>
-          </a:p>
-          <a:p>
-            <a:pPr marL="0" indent="0">
-              <a:buNone/>
-            </a:pPr>
+              <a:t> = [[“1, 5, 7”, “0, 2”, “3, 6, 9”],</a:t>
+            </a:r>
+          </a:p>
+          <a:p>
+            <a:pPr marL="0" indent="0">
+              <a:buNone/>
+            </a:pPr>
+            <a:r>
+              <a:rPr lang="en-US" sz="2000" dirty="0">
+                <a:solidFill>
+                  <a:schemeClr val="bg1"/>
+                </a:solidFill>
+                <a:latin typeface="+mj-lt"/>
+                <a:cs typeface="Courier New" panose="02070309020205020404" pitchFamily="49" charset="0"/>
+              </a:rPr>
+              <a:t>	 </a:t>
+            </a:r>
             <a:r>
               <a:rPr lang="en-US" sz="2000" dirty="0" smtClean="0">
                 <a:solidFill>
@@ -18190,17 +18118,22 @@
                 <a:latin typeface="+mj-lt"/>
                 <a:cs typeface="Courier New" panose="02070309020205020404" pitchFamily="49" charset="0"/>
               </a:rPr>
-              <a:t>var </a:t>
-            </a:r>
-            <a:r>
-              <a:rPr lang="en-US" sz="2000" dirty="0" err="1" smtClean="0">
-                <a:solidFill>
-                  <a:schemeClr val="bg1"/>
-                </a:solidFill>
-                <a:latin typeface="+mj-lt"/>
-                <a:cs typeface="Courier New" panose="02070309020205020404" pitchFamily="49" charset="0"/>
-              </a:rPr>
-              <a:t>myMatrix</a:t>
+              <a:t>           [“9, 7, 6”, “3, 5”, “2, 6”],</a:t>
+            </a:r>
+          </a:p>
+          <a:p>
+            <a:pPr marL="0" indent="0">
+              <a:buNone/>
+            </a:pPr>
+            <a:r>
+              <a:rPr lang="en-US" sz="2000" dirty="0">
+                <a:solidFill>
+                  <a:schemeClr val="bg1"/>
+                </a:solidFill>
+                <a:latin typeface="+mj-lt"/>
+                <a:cs typeface="Courier New" panose="02070309020205020404" pitchFamily="49" charset="0"/>
+              </a:rPr>
+              <a:t>	 </a:t>
             </a:r>
             <a:r>
               <a:rPr lang="en-US" sz="2000" dirty="0" smtClean="0">
@@ -18210,57 +18143,7 @@
                 <a:latin typeface="+mj-lt"/>
                 <a:cs typeface="Courier New" panose="02070309020205020404" pitchFamily="49" charset="0"/>
               </a:rPr>
-              <a:t> = [“1, 5, 7”, “0, 2”, “3, 6, 9”],</a:t>
-            </a:r>
-          </a:p>
-          <a:p>
-            <a:pPr marL="0" indent="0">
-              <a:buNone/>
-            </a:pPr>
-            <a:r>
-              <a:rPr lang="en-US" sz="2000" dirty="0">
-                <a:solidFill>
-                  <a:schemeClr val="bg1"/>
-                </a:solidFill>
-                <a:latin typeface="+mj-lt"/>
-                <a:cs typeface="Courier New" panose="02070309020205020404" pitchFamily="49" charset="0"/>
-              </a:rPr>
-              <a:t>	 </a:t>
-            </a:r>
-            <a:r>
-              <a:rPr lang="en-US" sz="2000" dirty="0" smtClean="0">
-                <a:solidFill>
-                  <a:schemeClr val="bg1"/>
-                </a:solidFill>
-                <a:latin typeface="+mj-lt"/>
-                <a:cs typeface="Courier New" panose="02070309020205020404" pitchFamily="49" charset="0"/>
-              </a:rPr>
-              <a:t>           [“9, 7, 6”, “3, 5”, “2, 6”],</a:t>
-            </a:r>
-          </a:p>
-          <a:p>
-            <a:pPr marL="0" indent="0">
-              <a:buNone/>
-            </a:pPr>
-            <a:r>
-              <a:rPr lang="en-US" sz="2000" dirty="0">
-                <a:solidFill>
-                  <a:schemeClr val="bg1"/>
-                </a:solidFill>
-                <a:latin typeface="+mj-lt"/>
-                <a:cs typeface="Courier New" panose="02070309020205020404" pitchFamily="49" charset="0"/>
-              </a:rPr>
-              <a:t>	 </a:t>
-            </a:r>
-            <a:r>
-              <a:rPr lang="en-US" sz="2000" dirty="0" smtClean="0">
-                <a:solidFill>
-                  <a:schemeClr val="bg1"/>
-                </a:solidFill>
-                <a:latin typeface="+mj-lt"/>
-                <a:cs typeface="Courier New" panose="02070309020205020404" pitchFamily="49" charset="0"/>
-              </a:rPr>
-              <a:t>           [“12, 44”, “36, 1”, 2, 9”];</a:t>
+              <a:t>           [“12, 44”, “36, 1”, 2, 9”]];</a:t>
             </a:r>
             <a:endParaRPr lang="bg-BG" sz="2000" dirty="0" smtClean="0">
               <a:solidFill>
@@ -21105,7 +20988,12 @@
             <p:ph idx="1"/>
           </p:nvPr>
         </p:nvSpPr>
-        <p:spPr/>
+        <p:spPr>
+          <a:xfrm>
+            <a:off x="685800" y="1676400"/>
+            <a:ext cx="8229600" cy="4525963"/>
+          </a:xfrm>
+        </p:spPr>
         <p:txBody>
           <a:bodyPr>
             <a:noAutofit/>
@@ -21680,7 +21568,27 @@
               <a:buChar char="-"/>
             </a:pPr>
             <a:r>
-              <a:rPr lang="en-US" sz="3000" dirty="0" err="1" smtClean="0">
+              <a:rPr lang="en-US" sz="3000" dirty="0" smtClean="0">
+                <a:solidFill>
+                  <a:schemeClr val="bg1"/>
+                </a:solidFill>
+                <a:latin typeface="+mj-lt"/>
+                <a:cs typeface="Courier New" panose="02070309020205020404" pitchFamily="49" charset="0"/>
+              </a:rPr>
+              <a:t>) – </a:t>
+            </a:r>
+            <a:r>
+              <a:rPr lang="bg-BG" sz="3000" dirty="0" smtClean="0">
+                <a:solidFill>
+                  <a:schemeClr val="bg1"/>
+                </a:solidFill>
+                <a:latin typeface="+mj-lt"/>
+                <a:cs typeface="Courier New" panose="02070309020205020404" pitchFamily="49" charset="0"/>
+              </a:rPr>
+              <a:t>връща индекса на първото</a:t>
+            </a:r>
+            <a:r>
+              <a:rPr lang="en-US" sz="3000" dirty="0" err="1">
                 <a:solidFill>
                   <a:srgbClr val="92D050"/>
                 </a:solidFill>
@@ -21690,14 +21598,14 @@
               <a:t>array.indexOf</a:t>
             </a:r>
             <a:r>
-              <a:rPr lang="en-US" sz="3000" dirty="0" smtClean="0">
-                <a:solidFill>
-                  <a:schemeClr val="bg1"/>
-                </a:solidFill>
-                <a:latin typeface="+mj-lt"/>
-                <a:cs typeface="Courier New" panose="02070309020205020404" pitchFamily="49" charset="0"/>
-              </a:rPr>
-              <a:t>(element) – </a:t>
+              <a:rPr lang="en-US" sz="3000" dirty="0">
+                <a:solidFill>
+                  <a:schemeClr val="bg1"/>
+                </a:solidFill>
+                <a:latin typeface="+mj-lt"/>
+                <a:cs typeface="Courier New" panose="02070309020205020404" pitchFamily="49" charset="0"/>
+              </a:rPr>
+              <a:t>(element</a:t>
             </a:r>
             <a:r>
               <a:rPr lang="bg-BG" sz="3000" dirty="0" smtClean="0">
@@ -21707,7 +21615,7 @@
                 <a:latin typeface="+mj-lt"/>
                 <a:cs typeface="Courier New" panose="02070309020205020404" pitchFamily="49" charset="0"/>
               </a:rPr>
-              <a:t>връща индекса на първото съвпадение в масив</a:t>
+              <a:t> съвпадение в масив</a:t>
             </a:r>
             <a:r>
               <a:rPr lang="en-US" sz="3000" dirty="0" smtClean="0">
@@ -21877,7 +21785,7 @@
                 <a:latin typeface="+mj-lt"/>
                 <a:cs typeface="Courier New" panose="02070309020205020404" pitchFamily="49" charset="0"/>
               </a:rPr>
-              <a:t>връща индекса на първото съвпадение в масива или връща „-1“ ако елементът не съществува</a:t>
+              <a:t>връща индекса на последното съвпадение в масива или връща „-1“ ако елементът не съществува</a:t>
             </a:r>
           </a:p>
           <a:p>
@@ -30941,25 +30849,8 @@
                   </a:schemeClr>
                 </a:solidFill>
               </a:rPr>
-              <a:t>Напишете израз, който намира всички делими на 4 и на 9 числа, които се намират в интервала от 20 до 60</a:t>
-            </a:r>
-            <a:r>
-              <a:rPr lang="bg-BG" sz="2000" b="1" dirty="0" smtClean="0">
-                <a:solidFill>
-                  <a:schemeClr val="bg1">
-                    <a:lumMod val="95000"/>
-                  </a:schemeClr>
-                </a:solidFill>
-              </a:rPr>
-              <a:t>.</a:t>
-            </a:r>
-            <a:endParaRPr lang="bg-BG" sz="2000" b="1" dirty="0" smtClean="0">
-              <a:solidFill>
-                <a:schemeClr val="bg1">
-                  <a:lumMod val="95000"/>
-                </a:schemeClr>
-              </a:solidFill>
-            </a:endParaRPr>
+              <a:t>Напишете израз, който намира всички делими на 4 и на 9 числа, които се намират в интервала от 20 до 60.</a:t>
+            </a:r>
           </a:p>
         </p:txBody>
       </p:sp>
@@ -31065,18 +30956,28 @@
             <a:r>
               <a:rPr lang="en-US" sz="2000" b="1" dirty="0" smtClean="0">
                 <a:solidFill>
-                  <a:schemeClr val="bg1">
-                    <a:lumMod val="95000"/>
+                  <a:schemeClr val="accent3">
+                    <a:lumMod val="75000"/>
                   </a:schemeClr>
                 </a:solidFill>
               </a:rPr>
-              <a:t>10. </a:t>
+              <a:t>10</a:t>
+            </a:r>
+            <a:r>
+              <a:rPr lang="en-US" sz="2000" b="1" dirty="0" smtClean="0">
+                <a:solidFill>
+                  <a:schemeClr val="accent3">
+                    <a:lumMod val="75000"/>
+                  </a:schemeClr>
+                </a:solidFill>
+              </a:rPr>
+              <a:t>.* </a:t>
             </a:r>
             <a:r>
               <a:rPr lang="bg-BG" sz="2000" b="1" dirty="0">
                 <a:solidFill>
-                  <a:schemeClr val="bg1">
-                    <a:lumMod val="95000"/>
+                  <a:schemeClr val="accent3">
+                    <a:lumMod val="75000"/>
                   </a:schemeClr>
                 </a:solidFill>
               </a:rPr>
@@ -31085,8 +30986,8 @@
             <a:r>
               <a:rPr lang="bg-BG" sz="2000" b="1" dirty="0" smtClean="0">
                 <a:solidFill>
-                  <a:schemeClr val="bg1">
-                    <a:lumMod val="95000"/>
+                  <a:schemeClr val="accent3">
+                    <a:lumMod val="75000"/>
                   </a:schemeClr>
                 </a:solidFill>
               </a:rPr>
@@ -31095,8 +30996,8 @@
             <a:r>
               <a:rPr lang="bg-BG" sz="2000" b="1" dirty="0">
                 <a:solidFill>
-                  <a:schemeClr val="bg1">
-                    <a:lumMod val="95000"/>
+                  <a:schemeClr val="accent3">
+                    <a:lumMod val="75000"/>
                   </a:schemeClr>
                 </a:solidFill>
               </a:rPr>
@@ -31104,8 +31005,8 @@
             </a:r>
             <a:endParaRPr lang="en-US" sz="2000" b="1" dirty="0">
               <a:solidFill>
-                <a:schemeClr val="bg1">
-                  <a:lumMod val="95000"/>
+                <a:schemeClr val="accent3">
+                  <a:lumMod val="75000"/>
                 </a:schemeClr>
               </a:solidFill>
             </a:endParaRPr>
@@ -31117,8 +31018,8 @@
             <a:r>
               <a:rPr lang="en-US" sz="2000" b="1" dirty="0">
                 <a:solidFill>
-                  <a:schemeClr val="bg1">
-                    <a:lumMod val="95000"/>
+                  <a:schemeClr val="accent3">
+                    <a:lumMod val="75000"/>
                   </a:schemeClr>
                 </a:solidFill>
               </a:rPr>
@@ -31127,8 +31028,8 @@
             <a:r>
               <a:rPr lang="en-US" sz="2000" b="1" dirty="0" smtClean="0">
                 <a:solidFill>
-                  <a:schemeClr val="bg1">
-                    <a:lumMod val="95000"/>
+                  <a:schemeClr val="accent3">
+                    <a:lumMod val="75000"/>
                   </a:schemeClr>
                 </a:solidFill>
               </a:rPr>
@@ -31142,28 +31043,48 @@
             <a:r>
               <a:rPr lang="en-US" sz="2000" b="1" dirty="0" smtClean="0">
                 <a:solidFill>
-                  <a:schemeClr val="bg1">
-                    <a:lumMod val="95000"/>
+                  <a:schemeClr val="accent3">
+                    <a:lumMod val="75000"/>
                   </a:schemeClr>
                 </a:solidFill>
               </a:rPr>
-              <a:t>11. </a:t>
+              <a:t>11</a:t>
+            </a:r>
+            <a:r>
+              <a:rPr lang="en-US" sz="2000" b="1" dirty="0" smtClean="0">
+                <a:solidFill>
+                  <a:schemeClr val="accent3">
+                    <a:lumMod val="75000"/>
+                  </a:schemeClr>
+                </a:solidFill>
+              </a:rPr>
+              <a:t>.* </a:t>
             </a:r>
             <a:r>
               <a:rPr lang="bg-BG" sz="2000" b="1" dirty="0" smtClean="0">
                 <a:solidFill>
-                  <a:schemeClr val="bg1">
-                    <a:lumMod val="95000"/>
+                  <a:schemeClr val="accent3">
+                    <a:lumMod val="75000"/>
                   </a:schemeClr>
                 </a:solidFill>
               </a:rPr>
-              <a:t>Напишете скрипт, който </a:t>
+              <a:t>Напишете </a:t>
+            </a:r>
+            <a:r>
+              <a:rPr lang="bg-BG" sz="2000" b="1" dirty="0" smtClean="0">
+                <a:solidFill>
+                  <a:schemeClr val="accent3">
+                    <a:lumMod val="75000"/>
+                  </a:schemeClr>
+                </a:solidFill>
+              </a:rPr>
+              <a:t>скрипт, който </a:t>
             </a:r>
             <a:r>
               <a:rPr lang="en-US" sz="2000" b="1" dirty="0" smtClean="0">
                 <a:solidFill>
-                  <a:schemeClr val="bg1">
-                    <a:lumMod val="95000"/>
+                  <a:schemeClr val="accent3">
+                    <a:lumMod val="75000"/>
                   </a:schemeClr>
                 </a:solidFill>
               </a:rPr>
@@ -31172,8 +31093,8 @@
             <a:r>
               <a:rPr lang="bg-BG" sz="2000" b="1" dirty="0" smtClean="0">
                 <a:solidFill>
-                  <a:schemeClr val="bg1">
-                    <a:lumMod val="95000"/>
+                  <a:schemeClr val="accent3">
+                    <a:lumMod val="75000"/>
                   </a:schemeClr>
                 </a:solidFill>
               </a:rPr>
@@ -31294,8 +31215,8 @@
             <a:r>
               <a:rPr lang="en-US" sz="2000" b="1" dirty="0" smtClean="0">
                 <a:solidFill>
-                  <a:schemeClr val="bg1">
-                    <a:lumMod val="95000"/>
+                  <a:schemeClr val="accent3">
+                    <a:lumMod val="75000"/>
                   </a:schemeClr>
                 </a:solidFill>
               </a:rPr>
@@ -31304,43 +31225,73 @@
             <a:r>
               <a:rPr lang="bg-BG" sz="2000" b="1" dirty="0" smtClean="0">
                 <a:solidFill>
-                  <a:schemeClr val="bg1">
-                    <a:lumMod val="95000"/>
+                  <a:schemeClr val="accent3">
+                    <a:lumMod val="75000"/>
                   </a:schemeClr>
                 </a:solidFill>
               </a:rPr>
-              <a:t>. Напишете функция, която при извикването си сменя съдържанието на елемент по избор.</a:t>
-            </a:r>
-          </a:p>
-          <a:p>
-            <a:pPr marL="0" indent="0">
-              <a:buNone/>
-            </a:pPr>
+              <a:t>.</a:t>
+            </a:r>
+            <a:r>
+              <a:rPr lang="en-US" sz="2000" b="1" dirty="0" smtClean="0">
+                <a:solidFill>
+                  <a:schemeClr val="accent3">
+                    <a:lumMod val="75000"/>
+                  </a:schemeClr>
+                </a:solidFill>
+              </a:rPr>
+              <a:t>*</a:t>
+            </a:r>
             <a:r>
               <a:rPr lang="bg-BG" sz="2000" b="1" dirty="0" smtClean="0">
                 <a:solidFill>
-                  <a:schemeClr val="bg1">
-                    <a:lumMod val="95000"/>
+                  <a:schemeClr val="accent3">
+                    <a:lumMod val="75000"/>
                   </a:schemeClr>
                 </a:solidFill>
               </a:rPr>
+              <a:t> </a:t>
+            </a:r>
+            <a:r>
+              <a:rPr lang="bg-BG" sz="2000" b="1" dirty="0" smtClean="0">
+                <a:solidFill>
+                  <a:schemeClr val="accent3">
+                    <a:lumMod val="75000"/>
+                  </a:schemeClr>
+                </a:solidFill>
+              </a:rPr>
+              <a:t>Напишете функция, която при извикването си сменя съдържанието на елемент по избор.</a:t>
+            </a:r>
+          </a:p>
+          <a:p>
+            <a:pPr marL="0" indent="0">
+              <a:buNone/>
+            </a:pPr>
+            <a:r>
+              <a:rPr lang="bg-BG" sz="2000" b="1" dirty="0" smtClean="0">
+                <a:solidFill>
+                  <a:schemeClr val="accent3">
+                    <a:lumMod val="75000"/>
+                  </a:schemeClr>
+                </a:solidFill>
+              </a:rPr>
               <a:t>1</a:t>
             </a:r>
             <a:r>
               <a:rPr lang="en-US" sz="2000" b="1" dirty="0" smtClean="0">
                 <a:solidFill>
-                  <a:schemeClr val="bg1">
-                    <a:lumMod val="95000"/>
+                  <a:schemeClr val="accent3">
+                    <a:lumMod val="75000"/>
                   </a:schemeClr>
                 </a:solidFill>
               </a:rPr>
-              <a:t>5.</a:t>
+              <a:t>5.*</a:t>
             </a:r>
             <a:r>
               <a:rPr lang="bg-BG" sz="2000" b="1" dirty="0" smtClean="0">
                 <a:solidFill>
-                  <a:schemeClr val="bg1">
-                    <a:lumMod val="95000"/>
+                  <a:schemeClr val="accent3">
+                    <a:lumMod val="75000"/>
                   </a:schemeClr>
                 </a:solidFill>
               </a:rPr>
@@ -31349,8 +31300,8 @@
             <a:r>
               <a:rPr lang="bg-BG" sz="2000" u="sng" dirty="0" smtClean="0">
                 <a:solidFill>
-                  <a:schemeClr val="bg1">
-                    <a:lumMod val="95000"/>
+                  <a:schemeClr val="accent3">
+                    <a:lumMod val="75000"/>
                   </a:schemeClr>
                 </a:solidFill>
               </a:rPr>
@@ -31359,8 +31310,8 @@
             <a:r>
               <a:rPr lang="bg-BG" sz="2000" b="1" dirty="0" smtClean="0">
                 <a:solidFill>
-                  <a:schemeClr val="bg1">
-                    <a:lumMod val="95000"/>
+                  <a:schemeClr val="accent3">
+                    <a:lumMod val="75000"/>
                   </a:schemeClr>
                 </a:solidFill>
               </a:rPr>
@@ -31369,8 +31320,8 @@
             <a:r>
               <a:rPr lang="en-US" sz="2000" b="1" dirty="0" smtClean="0">
                 <a:solidFill>
-                  <a:schemeClr val="bg1">
-                    <a:lumMod val="95000"/>
+                  <a:schemeClr val="accent3">
+                    <a:lumMod val="75000"/>
                   </a:schemeClr>
                 </a:solidFill>
               </a:rPr>
@@ -31379,8 +31330,8 @@
             <a:r>
               <a:rPr lang="bg-BG" sz="2000" b="1" dirty="0" smtClean="0">
                 <a:solidFill>
-                  <a:schemeClr val="bg1">
-                    <a:lumMod val="95000"/>
+                  <a:schemeClr val="accent3">
+                    <a:lumMod val="75000"/>
                   </a:schemeClr>
                 </a:solidFill>
               </a:rPr>
@@ -31389,8 +31340,8 @@
             <a:r>
               <a:rPr lang="en-US" sz="2000" b="1" dirty="0" err="1" smtClean="0">
                 <a:solidFill>
-                  <a:schemeClr val="bg1">
-                    <a:lumMod val="95000"/>
+                  <a:schemeClr val="accent3">
+                    <a:lumMod val="75000"/>
                   </a:schemeClr>
                 </a:solidFill>
               </a:rPr>
@@ -31399,8 +31350,8 @@
             <a:r>
               <a:rPr lang="en-US" sz="2000" b="1" dirty="0" smtClean="0">
                 <a:solidFill>
-                  <a:schemeClr val="bg1">
-                    <a:lumMod val="95000"/>
+                  <a:schemeClr val="accent3">
+                    <a:lumMod val="75000"/>
                   </a:schemeClr>
                 </a:solidFill>
               </a:rPr>
@@ -31409,8 +31360,8 @@
             <a:r>
               <a:rPr lang="bg-BG" sz="2000" b="1" dirty="0" smtClean="0">
                 <a:solidFill>
-                  <a:schemeClr val="bg1">
-                    <a:lumMod val="95000"/>
+                  <a:schemeClr val="accent3">
+                    <a:lumMod val="75000"/>
                   </a:schemeClr>
                 </a:solidFill>
               </a:rPr>
@@ -31418,8 +31369,8 @@
             </a:r>
             <a:endParaRPr lang="bg-BG" sz="2000" b="1" dirty="0">
               <a:solidFill>
-                <a:schemeClr val="bg1">
-                  <a:lumMod val="95000"/>
+                <a:schemeClr val="accent3">
+                  <a:lumMod val="75000"/>
                 </a:schemeClr>
               </a:solidFill>
             </a:endParaRPr>
@@ -31559,13 +31510,6 @@
               </a:rPr>
               <a:t>onsole.log()</a:t>
             </a:r>
-            <a:endParaRPr lang="en-US" sz="2500" dirty="0" smtClean="0">
-              <a:solidFill>
-                <a:schemeClr val="bg1"/>
-              </a:solidFill>
-              <a:latin typeface="+mj-lt"/>
-              <a:cs typeface="Courier New" panose="02070309020205020404" pitchFamily="49" charset="0"/>
-            </a:endParaRPr>
           </a:p>
           <a:p>
             <a:pPr>
@@ -31592,13 +31536,6 @@
               </a:rPr>
               <a:t>lert()</a:t>
             </a:r>
-            <a:endParaRPr lang="en-US" sz="2500" dirty="0" smtClean="0">
-              <a:solidFill>
-                <a:schemeClr val="bg1"/>
-              </a:solidFill>
-              <a:latin typeface="+mj-lt"/>
-              <a:cs typeface="Courier New" panose="02070309020205020404" pitchFamily="49" charset="0"/>
-            </a:endParaRPr>
           </a:p>
           <a:p>
             <a:pPr>
@@ -31635,13 +31572,6 @@
               </a:rPr>
               <a:t>()</a:t>
             </a:r>
-            <a:endParaRPr lang="en-US" sz="2500" dirty="0" smtClean="0">
-              <a:solidFill>
-                <a:schemeClr val="bg1"/>
-              </a:solidFill>
-              <a:latin typeface="+mj-lt"/>
-              <a:cs typeface="Courier New" panose="02070309020205020404" pitchFamily="49" charset="0"/>
-            </a:endParaRPr>
           </a:p>
         </p:txBody>
       </p:sp>

</xml_diff>